<commit_message>
add all material of week1
</commit_message>
<xml_diff>
--- a/assets/23-slides/1-intro.pptx
+++ b/assets/23-slides/1-intro.pptx
@@ -6962,23 +6962,6 @@
                 <a:hlinkClick r:id="rId3"/>
               </a:rPr>
               <a:t>https://mp.weixin.qq.com/s/juWtNUnIuFJfXoP_6eKIKg</a:t>
-            </a:r>
-            <a:endParaRPr lang="en-US" altLang="zh-CN" dirty="0">
-              <a:hlinkClick r:id="rId2">
-                <a:extLst>
-                  <a:ext uri="{A12FA001-AC4F-418D-AE19-62706E023703}">
-                    <ahyp:hlinkClr xmlns:ahyp="http://schemas.microsoft.com/office/drawing/2018/hyperlinkcolor" val="tx"/>
-                  </a:ext>
-                </a:extLst>
-              </a:hlinkClick>
-            </a:endParaRPr>
-          </a:p>
-          <a:p>
-            <a:r>
-              <a:rPr lang="en-US" altLang="zh-CN" dirty="0">
-                <a:hlinkClick r:id="rId4"/>
-              </a:rPr>
-              <a:t>https://mp.weixin.qq.com/s/ek94ZTbAnqBKRh6QawF-WQ</a:t>
             </a:r>
             <a:endParaRPr lang="zh-CN" altLang="en-US" dirty="0"/>
           </a:p>

</xml_diff>